<commit_message>
rephrase on the first slide
</commit_message>
<xml_diff>
--- a/ContinuousIntegrationDeployment/continuous-integration-deployment.pptx
+++ b/ContinuousIntegrationDeployment/continuous-integration-deployment.pptx
@@ -520,7 +520,15 @@
           <a:p>
             <a:r>
               <a:rPr lang="en-US" dirty="0" smtClean="0"/>
-              <a:t>For many of us, the cartoon with the overcomplicated process chart with a step  reading “some miracle happens here” (the one that</a:t>
+              <a:t>For many of us, the cartoon with the overcomplicated process chart with </a:t>
+            </a:r>
+            <a:r>
+              <a:rPr lang="en-US" dirty="0" smtClean="0"/>
+              <a:t>the step </a:t>
+            </a:r>
+            <a:r>
+              <a:rPr lang="en-US" dirty="0" smtClean="0"/>
+              <a:t>reading “some miracle happens here” (the one that</a:t>
             </a:r>
             <a:r>
               <a:rPr lang="en-US" baseline="0" dirty="0" smtClean="0"/>
@@ -528,8 +536,37 @@
             </a:r>
             <a:r>
               <a:rPr lang="en-US" dirty="0" smtClean="0"/>
-              <a:t>you might want to be a little more detailed on this”) is a reminder of the late night caffeine powered release process finishing at dawn due to similarly documented release procedures. </a:t>
-            </a:r>
+              <a:t>you might want to be a little more detailed </a:t>
+            </a:r>
+            <a:r>
+              <a:rPr lang="en-US" dirty="0" smtClean="0"/>
+              <a:t>about”) </a:t>
+            </a:r>
+            <a:r>
+              <a:rPr lang="en-US" dirty="0" smtClean="0"/>
+              <a:t>is a reminder of the late night caffeine powered </a:t>
+            </a:r>
+            <a:r>
+              <a:rPr lang="en-US" dirty="0" smtClean="0"/>
+              <a:t>releases finishing </a:t>
+            </a:r>
+            <a:r>
+              <a:rPr lang="en-US" dirty="0" smtClean="0"/>
+              <a:t>at dawn due to similarly </a:t>
+            </a:r>
+            <a:r>
+              <a:rPr lang="en-US" dirty="0" smtClean="0"/>
+              <a:t>well documented </a:t>
+            </a:r>
+            <a:r>
+              <a:rPr lang="en-US" dirty="0" smtClean="0"/>
+              <a:t>release </a:t>
+            </a:r>
+            <a:r>
+              <a:rPr lang="en-US" dirty="0" smtClean="0"/>
+              <a:t>procedure. </a:t>
+            </a:r>
+            <a:endParaRPr lang="en-US" dirty="0" smtClean="0"/>
           </a:p>
           <a:p>
             <a:endParaRPr lang="en-US" dirty="0"/>
@@ -1562,11 +1599,7 @@
           <a:p>
             <a:r>
               <a:rPr lang="en-US" dirty="0" smtClean="0"/>
-              <a:t>Feel free to contact me! </a:t>
-            </a:r>
-            <a:r>
-              <a:rPr lang="en-US" dirty="0" smtClean="0"/>
-              <a:t>I’m on twitter (</a:t>
+              <a:t>Feel free to contact me! I’m on twitter (</a:t>
             </a:r>
             <a:r>
               <a:rPr lang="en-US" dirty="0" smtClean="0">

</xml_diff>

<commit_message>
inlined pictures because pptx doesn't use relative paths for file links
</commit_message>
<xml_diff>
--- a/ContinuousIntegrationDeployment/continuous-integration-deployment.pptx
+++ b/ContinuousIntegrationDeployment/continuous-integration-deployment.pptx
@@ -206,7 +206,7 @@
           <a:p>
             <a:fld id="{AF2DAE34-CE0A-4FAB-B802-327033E7D189}" type="datetimeFigureOut">
               <a:rPr lang="hu-HU" smtClean="0"/>
-              <a:t>2010.09.29.</a:t>
+              <a:t>2010.10.10.</a:t>
             </a:fld>
             <a:endParaRPr lang="hu-HU"/>
           </a:p>
@@ -520,15 +520,7 @@
           <a:p>
             <a:r>
               <a:rPr lang="en-US" dirty="0" smtClean="0"/>
-              <a:t>For many of us, the cartoon with the overcomplicated process chart with </a:t>
-            </a:r>
-            <a:r>
-              <a:rPr lang="en-US" dirty="0" smtClean="0"/>
-              <a:t>the step </a:t>
-            </a:r>
-            <a:r>
-              <a:rPr lang="en-US" dirty="0" smtClean="0"/>
-              <a:t>reading “some miracle happens here” (the one that</a:t>
+              <a:t>For many of us, the cartoon with the overcomplicated process chart with the step reading “some miracle happens here” (the one that</a:t>
             </a:r>
             <a:r>
               <a:rPr lang="en-US" baseline="0" dirty="0" smtClean="0"/>
@@ -536,37 +528,8 @@
             </a:r>
             <a:r>
               <a:rPr lang="en-US" dirty="0" smtClean="0"/>
-              <a:t>you might want to be a little more detailed </a:t>
-            </a:r>
-            <a:r>
-              <a:rPr lang="en-US" dirty="0" smtClean="0"/>
-              <a:t>about”) </a:t>
-            </a:r>
-            <a:r>
-              <a:rPr lang="en-US" dirty="0" smtClean="0"/>
-              <a:t>is a reminder of the late night caffeine powered </a:t>
-            </a:r>
-            <a:r>
-              <a:rPr lang="en-US" dirty="0" smtClean="0"/>
-              <a:t>releases finishing </a:t>
-            </a:r>
-            <a:r>
-              <a:rPr lang="en-US" dirty="0" smtClean="0"/>
-              <a:t>at dawn due to similarly </a:t>
-            </a:r>
-            <a:r>
-              <a:rPr lang="en-US" dirty="0" smtClean="0"/>
-              <a:t>well documented </a:t>
-            </a:r>
-            <a:r>
-              <a:rPr lang="en-US" dirty="0" smtClean="0"/>
-              <a:t>release </a:t>
-            </a:r>
-            <a:r>
-              <a:rPr lang="en-US" dirty="0" smtClean="0"/>
-              <a:t>procedure. </a:t>
-            </a:r>
-            <a:endParaRPr lang="en-US" dirty="0" smtClean="0"/>
+              <a:t>you might want to be a little more detailed about”) is a reminder of the late night caffeine powered releases finishing at dawn due to similarly well documented release procedure. </a:t>
+            </a:r>
           </a:p>
           <a:p>
             <a:endParaRPr lang="en-US" dirty="0"/>
@@ -1615,7 +1578,15 @@
             </a:r>
             <a:r>
               <a:rPr lang="en-US" dirty="0" smtClean="0"/>
-              <a:t>), I blog (</a:t>
+              <a:t>), </a:t>
+            </a:r>
+            <a:r>
+              <a:rPr lang="en-US" dirty="0" smtClean="0"/>
+              <a:t>and I </a:t>
+            </a:r>
+            <a:r>
+              <a:rPr lang="en-US" dirty="0" smtClean="0"/>
+              <a:t>blog (</a:t>
             </a:r>
             <a:r>
               <a:rPr lang="en-US" dirty="0" smtClean="0">
@@ -3748,7 +3719,7 @@
           <a:p>
             <a:fld id="{EDBB7497-BEE2-4389-AEC5-CEB669DC10BD}" type="datetimeFigureOut">
               <a:rPr lang="hu-HU" smtClean="0"/>
-              <a:t>2010.09.29.</a:t>
+              <a:t>2010.10.10.</a:t>
             </a:fld>
             <a:endParaRPr lang="hu-HU"/>
           </a:p>
@@ -3944,7 +3915,7 @@
           <a:p>
             <a:fld id="{EDBB7497-BEE2-4389-AEC5-CEB669DC10BD}" type="datetimeFigureOut">
               <a:rPr lang="hu-HU" smtClean="0"/>
-              <a:t>2010.09.29.</a:t>
+              <a:t>2010.10.10.</a:t>
             </a:fld>
             <a:endParaRPr lang="hu-HU"/>
           </a:p>
@@ -4130,7 +4101,7 @@
           <a:p>
             <a:fld id="{EDBB7497-BEE2-4389-AEC5-CEB669DC10BD}" type="datetimeFigureOut">
               <a:rPr lang="hu-HU" smtClean="0"/>
-              <a:t>2010.09.29.</a:t>
+              <a:t>2010.10.10.</a:t>
             </a:fld>
             <a:endParaRPr lang="hu-HU"/>
           </a:p>
@@ -4392,7 +4363,7 @@
           <a:p>
             <a:fld id="{EDBB7497-BEE2-4389-AEC5-CEB669DC10BD}" type="datetimeFigureOut">
               <a:rPr lang="hu-HU" smtClean="0"/>
-              <a:t>2010.09.29.</a:t>
+              <a:t>2010.10.10.</a:t>
             </a:fld>
             <a:endParaRPr lang="hu-HU"/>
           </a:p>
@@ -4696,7 +4667,7 @@
           <a:p>
             <a:fld id="{EDBB7497-BEE2-4389-AEC5-CEB669DC10BD}" type="datetimeFigureOut">
               <a:rPr lang="hu-HU" smtClean="0"/>
-              <a:t>2010.09.29.</a:t>
+              <a:t>2010.10.10.</a:t>
             </a:fld>
             <a:endParaRPr lang="hu-HU"/>
           </a:p>
@@ -5134,7 +5105,7 @@
           <a:p>
             <a:fld id="{EDBB7497-BEE2-4389-AEC5-CEB669DC10BD}" type="datetimeFigureOut">
               <a:rPr lang="hu-HU" smtClean="0"/>
-              <a:t>2010.09.29.</a:t>
+              <a:t>2010.10.10.</a:t>
             </a:fld>
             <a:endParaRPr lang="hu-HU"/>
           </a:p>
@@ -5268,7 +5239,7 @@
           <a:p>
             <a:fld id="{EDBB7497-BEE2-4389-AEC5-CEB669DC10BD}" type="datetimeFigureOut">
               <a:rPr lang="hu-HU" smtClean="0"/>
-              <a:t>2010.09.29.</a:t>
+              <a:t>2010.10.10.</a:t>
             </a:fld>
             <a:endParaRPr lang="hu-HU"/>
           </a:p>
@@ -5379,7 +5350,7 @@
           <a:p>
             <a:fld id="{EDBB7497-BEE2-4389-AEC5-CEB669DC10BD}" type="datetimeFigureOut">
               <a:rPr lang="hu-HU" smtClean="0"/>
-              <a:t>2010.09.29.</a:t>
+              <a:t>2010.10.10.</a:t>
             </a:fld>
             <a:endParaRPr lang="hu-HU"/>
           </a:p>
@@ -5672,7 +5643,7 @@
           <a:p>
             <a:fld id="{EDBB7497-BEE2-4389-AEC5-CEB669DC10BD}" type="datetimeFigureOut">
               <a:rPr lang="hu-HU" smtClean="0"/>
-              <a:t>2010.09.29.</a:t>
+              <a:t>2010.10.10.</a:t>
             </a:fld>
             <a:endParaRPr lang="hu-HU"/>
           </a:p>
@@ -5941,7 +5912,7 @@
           <a:p>
             <a:fld id="{EDBB7497-BEE2-4389-AEC5-CEB669DC10BD}" type="datetimeFigureOut">
               <a:rPr lang="hu-HU" smtClean="0"/>
-              <a:t>2010.09.29.</a:t>
+              <a:t>2010.10.10.</a:t>
             </a:fld>
             <a:endParaRPr lang="hu-HU"/>
           </a:p>
@@ -6611,7 +6582,13 @@
           <p:nvPr/>
         </p:nvPicPr>
         <p:blipFill>
-          <a:blip r:link="rId6"/>
+          <a:blip r:embed="rId6" cstate="print">
+            <a:extLst>
+              <a:ext uri="{28A0092B-C50C-407E-A947-70E740481C1C}">
+                <a14:useLocalDpi xmlns:a14="http://schemas.microsoft.com/office/drawing/2010/main" val="0"/>
+              </a:ext>
+            </a:extLst>
+          </a:blip>
           <a:stretch>
             <a:fillRect/>
           </a:stretch>
@@ -6619,7 +6596,7 @@
         <p:spPr>
           <a:xfrm>
             <a:off x="5580112" y="522492"/>
-            <a:ext cx="3159398" cy="2160240"/>
+            <a:ext cx="3159397" cy="2160240"/>
           </a:xfrm>
           <a:prstGeom prst="rect">
             <a:avLst/>
@@ -6635,15 +6612,21 @@
           <p:nvPr/>
         </p:nvPicPr>
         <p:blipFill>
-          <a:blip r:link="rId7"/>
+          <a:blip r:embed="rId7" cstate="print">
+            <a:extLst>
+              <a:ext uri="{28A0092B-C50C-407E-A947-70E740481C1C}">
+                <a14:useLocalDpi xmlns:a14="http://schemas.microsoft.com/office/drawing/2010/main" val="0"/>
+              </a:ext>
+            </a:extLst>
+          </a:blip>
           <a:stretch>
             <a:fillRect/>
           </a:stretch>
         </p:blipFill>
         <p:spPr>
           <a:xfrm>
-            <a:off x="179512" y="5366874"/>
-            <a:ext cx="1811383" cy="967640"/>
+            <a:off x="312328" y="5366874"/>
+            <a:ext cx="1545750" cy="967640"/>
           </a:xfrm>
           <a:prstGeom prst="rect">
             <a:avLst/>
@@ -6697,7 +6680,7 @@
     <p:bg>
       <p:bgPr>
         <a:blipFill dpi="0" rotWithShape="1">
-          <a:blip r:link="rId3">
+          <a:blip r:embed="rId3">
             <a:lum/>
           </a:blip>
           <a:srcRect/>
@@ -6772,7 +6755,7 @@
     <p:bg>
       <p:bgPr>
         <a:blipFill dpi="0" rotWithShape="1">
-          <a:blip r:link="rId3">
+          <a:blip r:embed="rId3">
             <a:lum/>
           </a:blip>
           <a:srcRect/>
@@ -6816,7 +6799,7 @@
     <p:bg>
       <p:bgPr>
         <a:blipFill dpi="0" rotWithShape="1">
-          <a:blip r:link="rId3">
+          <a:blip r:embed="rId3">
             <a:lum/>
           </a:blip>
           <a:srcRect/>
@@ -6860,7 +6843,7 @@
     <p:bg>
       <p:bgPr>
         <a:blipFill dpi="0" rotWithShape="1">
-          <a:blip r:link="rId3">
+          <a:blip r:embed="rId3">
             <a:lum/>
           </a:blip>
           <a:srcRect/>
@@ -6904,7 +6887,7 @@
     <p:bg>
       <p:bgPr>
         <a:blipFill dpi="0" rotWithShape="1">
-          <a:blip r:link="rId3">
+          <a:blip r:embed="rId3">
             <a:lum/>
           </a:blip>
           <a:srcRect/>
@@ -6948,7 +6931,7 @@
     <p:bg>
       <p:bgPr>
         <a:blipFill dpi="0" rotWithShape="1">
-          <a:blip r:link="rId3">
+          <a:blip r:embed="rId3">
             <a:lum/>
           </a:blip>
           <a:srcRect/>
@@ -7022,7 +7005,7 @@
     <p:bg>
       <p:bgPr>
         <a:blipFill dpi="0" rotWithShape="1">
-          <a:blip r:link="rId3">
+          <a:blip r:embed="rId3">
             <a:lum/>
           </a:blip>
           <a:srcRect/>
@@ -7066,7 +7049,7 @@
     <p:bg>
       <p:bgPr>
         <a:blipFill dpi="0" rotWithShape="1">
-          <a:blip r:link="rId3">
+          <a:blip r:embed="rId3">
             <a:lum/>
           </a:blip>
           <a:srcRect/>
@@ -7110,7 +7093,7 @@
     <p:bg>
       <p:bgPr>
         <a:blipFill dpi="0" rotWithShape="1">
-          <a:blip r:link="rId3">
+          <a:blip r:embed="rId3">
             <a:lum/>
           </a:blip>
           <a:srcRect/>
@@ -7154,7 +7137,7 @@
     <p:bg>
       <p:bgPr>
         <a:blipFill dpi="0" rotWithShape="1">
-          <a:blip r:link="rId3">
+          <a:blip r:embed="rId3">
             <a:lum/>
           </a:blip>
           <a:srcRect/>
@@ -7188,7 +7171,13 @@
           <p:nvPr/>
         </p:nvPicPr>
         <p:blipFill>
-          <a:blip r:link="rId4"/>
+          <a:blip r:embed="rId4">
+            <a:extLst>
+              <a:ext uri="{28A0092B-C50C-407E-A947-70E740481C1C}">
+                <a14:useLocalDpi xmlns:a14="http://schemas.microsoft.com/office/drawing/2010/main" val="0"/>
+              </a:ext>
+            </a:extLst>
+          </a:blip>
           <a:stretch>
             <a:fillRect/>
           </a:stretch>
@@ -7196,7 +7185,7 @@
         <p:spPr>
           <a:xfrm>
             <a:off x="5076056" y="477305"/>
-            <a:ext cx="3295163" cy="2471372"/>
+            <a:ext cx="3295162" cy="2471372"/>
           </a:xfrm>
           <a:prstGeom prst="rect">
             <a:avLst/>
@@ -7212,7 +7201,13 @@
           <p:nvPr/>
         </p:nvPicPr>
         <p:blipFill>
-          <a:blip r:link="rId5"/>
+          <a:blip r:embed="rId5">
+            <a:extLst>
+              <a:ext uri="{28A0092B-C50C-407E-A947-70E740481C1C}">
+                <a14:useLocalDpi xmlns:a14="http://schemas.microsoft.com/office/drawing/2010/main" val="0"/>
+              </a:ext>
+            </a:extLst>
+          </a:blip>
           <a:stretch>
             <a:fillRect/>
           </a:stretch>
@@ -7337,7 +7332,7 @@
     <p:bg>
       <p:bgPr>
         <a:blipFill dpi="0" rotWithShape="1">
-          <a:blip r:link="rId3">
+          <a:blip r:embed="rId3">
             <a:lum/>
           </a:blip>
           <a:srcRect/>
@@ -7381,7 +7376,7 @@
     <p:bg>
       <p:bgPr>
         <a:blipFill dpi="0" rotWithShape="1">
-          <a:blip r:link="rId3">
+          <a:blip r:embed="rId3">
             <a:lum/>
           </a:blip>
           <a:srcRect/>
@@ -7425,7 +7420,7 @@
     <p:bg>
       <p:bgPr>
         <a:blipFill dpi="0" rotWithShape="1">
-          <a:blip r:link="rId3">
+          <a:blip r:embed="rId3">
             <a:lum/>
           </a:blip>
           <a:srcRect/>

</xml_diff>